<commit_message>
Updated for test presentation.
</commit_message>
<xml_diff>
--- a/Gradle.pptx
+++ b/Gradle.pptx
@@ -44,6 +44,13 @@
     <p:sldId id="294" r:id="rId38"/>
     <p:sldId id="295" r:id="rId39"/>
     <p:sldId id="296" r:id="rId40"/>
+    <p:sldId id="297" r:id="rId41"/>
+    <p:sldId id="298" r:id="rId42"/>
+    <p:sldId id="299" r:id="rId43"/>
+    <p:sldId id="300" r:id="rId44"/>
+    <p:sldId id="301" r:id="rId45"/>
+    <p:sldId id="302" r:id="rId46"/>
+    <p:sldId id="303" r:id="rId47"/>
   </p:sldIdLst>
   <p:sldSz cx="12192000" cy="6858000"/>
   <p:notesSz cx="6858000" cy="9144000"/>
@@ -281,7 +288,7 @@
           <a:p>
             <a:fld id="{CD7BE99B-5793-4A6C-9E18-95ED3231E162}" type="datetimeFigureOut">
               <a:rPr lang="en-US" smtClean="0"/>
-              <a:t>2/4/2018</a:t>
+              <a:t>2/8/2018</a:t>
             </a:fld>
             <a:endParaRPr lang="en-US"/>
           </a:p>
@@ -451,7 +458,7 @@
           <a:p>
             <a:fld id="{CD7BE99B-5793-4A6C-9E18-95ED3231E162}" type="datetimeFigureOut">
               <a:rPr lang="en-US" smtClean="0"/>
-              <a:t>2/4/2018</a:t>
+              <a:t>2/8/2018</a:t>
             </a:fld>
             <a:endParaRPr lang="en-US"/>
           </a:p>
@@ -631,7 +638,7 @@
           <a:p>
             <a:fld id="{CD7BE99B-5793-4A6C-9E18-95ED3231E162}" type="datetimeFigureOut">
               <a:rPr lang="en-US" smtClean="0"/>
-              <a:t>2/4/2018</a:t>
+              <a:t>2/8/2018</a:t>
             </a:fld>
             <a:endParaRPr lang="en-US"/>
           </a:p>
@@ -801,7 +808,7 @@
           <a:p>
             <a:fld id="{CD7BE99B-5793-4A6C-9E18-95ED3231E162}" type="datetimeFigureOut">
               <a:rPr lang="en-US" smtClean="0"/>
-              <a:t>2/4/2018</a:t>
+              <a:t>2/8/2018</a:t>
             </a:fld>
             <a:endParaRPr lang="en-US"/>
           </a:p>
@@ -1047,7 +1054,7 @@
           <a:p>
             <a:fld id="{CD7BE99B-5793-4A6C-9E18-95ED3231E162}" type="datetimeFigureOut">
               <a:rPr lang="en-US" smtClean="0"/>
-              <a:t>2/4/2018</a:t>
+              <a:t>2/8/2018</a:t>
             </a:fld>
             <a:endParaRPr lang="en-US"/>
           </a:p>
@@ -1279,7 +1286,7 @@
           <a:p>
             <a:fld id="{CD7BE99B-5793-4A6C-9E18-95ED3231E162}" type="datetimeFigureOut">
               <a:rPr lang="en-US" smtClean="0"/>
-              <a:t>2/4/2018</a:t>
+              <a:t>2/8/2018</a:t>
             </a:fld>
             <a:endParaRPr lang="en-US"/>
           </a:p>
@@ -1646,7 +1653,7 @@
           <a:p>
             <a:fld id="{CD7BE99B-5793-4A6C-9E18-95ED3231E162}" type="datetimeFigureOut">
               <a:rPr lang="en-US" smtClean="0"/>
-              <a:t>2/4/2018</a:t>
+              <a:t>2/8/2018</a:t>
             </a:fld>
             <a:endParaRPr lang="en-US"/>
           </a:p>
@@ -1764,7 +1771,7 @@
           <a:p>
             <a:fld id="{CD7BE99B-5793-4A6C-9E18-95ED3231E162}" type="datetimeFigureOut">
               <a:rPr lang="en-US" smtClean="0"/>
-              <a:t>2/4/2018</a:t>
+              <a:t>2/8/2018</a:t>
             </a:fld>
             <a:endParaRPr lang="en-US"/>
           </a:p>
@@ -1859,7 +1866,7 @@
           <a:p>
             <a:fld id="{CD7BE99B-5793-4A6C-9E18-95ED3231E162}" type="datetimeFigureOut">
               <a:rPr lang="en-US" smtClean="0"/>
-              <a:t>2/4/2018</a:t>
+              <a:t>2/8/2018</a:t>
             </a:fld>
             <a:endParaRPr lang="en-US"/>
           </a:p>
@@ -2136,7 +2143,7 @@
           <a:p>
             <a:fld id="{CD7BE99B-5793-4A6C-9E18-95ED3231E162}" type="datetimeFigureOut">
               <a:rPr lang="en-US" smtClean="0"/>
-              <a:t>2/4/2018</a:t>
+              <a:t>2/8/2018</a:t>
             </a:fld>
             <a:endParaRPr lang="en-US"/>
           </a:p>
@@ -2389,7 +2396,7 @@
           <a:p>
             <a:fld id="{CD7BE99B-5793-4A6C-9E18-95ED3231E162}" type="datetimeFigureOut">
               <a:rPr lang="en-US" smtClean="0"/>
-              <a:t>2/4/2018</a:t>
+              <a:t>2/8/2018</a:t>
             </a:fld>
             <a:endParaRPr lang="en-US"/>
           </a:p>
@@ -2602,7 +2609,7 @@
           <a:p>
             <a:fld id="{CD7BE99B-5793-4A6C-9E18-95ED3231E162}" type="datetimeFigureOut">
               <a:rPr lang="en-US" smtClean="0"/>
-              <a:t>2/4/2018</a:t>
+              <a:t>2/8/2018</a:t>
             </a:fld>
             <a:endParaRPr lang="en-US"/>
           </a:p>
@@ -6050,6 +6057,792 @@
 </p:sld>
 </file>
 
+<file path=ppt/slides/slide40.xml><?xml version="1.0" encoding="utf-8"?>
+<p:sld xmlns:a="http://schemas.openxmlformats.org/drawingml/2006/main" xmlns:r="http://schemas.openxmlformats.org/officeDocument/2006/relationships" xmlns:p="http://schemas.openxmlformats.org/presentationml/2006/main">
+  <p:cSld>
+    <p:spTree>
+      <p:nvGrpSpPr>
+        <p:cNvPr id="1" name=""/>
+        <p:cNvGrpSpPr/>
+        <p:nvPr/>
+      </p:nvGrpSpPr>
+      <p:grpSpPr>
+        <a:xfrm>
+          <a:off x="0" y="0"/>
+          <a:ext cx="0" cy="0"/>
+          <a:chOff x="0" y="0"/>
+          <a:chExt cx="0" cy="0"/>
+        </a:xfrm>
+      </p:grpSpPr>
+      <p:pic>
+        <p:nvPicPr>
+          <p:cNvPr id="2" name="Picture 1"/>
+          <p:cNvPicPr>
+            <a:picLocks noChangeAspect="1"/>
+          </p:cNvPicPr>
+          <p:nvPr/>
+        </p:nvPicPr>
+        <p:blipFill>
+          <a:blip r:embed="rId2"/>
+          <a:stretch>
+            <a:fillRect/>
+          </a:stretch>
+        </p:blipFill>
+        <p:spPr>
+          <a:xfrm>
+            <a:off x="1798912" y="777874"/>
+            <a:ext cx="9094214" cy="4060825"/>
+          </a:xfrm>
+          <a:prstGeom prst="rect">
+            <a:avLst/>
+          </a:prstGeom>
+        </p:spPr>
+      </p:pic>
+      <p:pic>
+        <p:nvPicPr>
+          <p:cNvPr id="3" name="Picture 2"/>
+          <p:cNvPicPr>
+            <a:picLocks noChangeAspect="1"/>
+          </p:cNvPicPr>
+          <p:nvPr/>
+        </p:nvPicPr>
+        <p:blipFill>
+          <a:blip r:embed="rId3"/>
+          <a:stretch>
+            <a:fillRect/>
+          </a:stretch>
+        </p:blipFill>
+        <p:spPr>
+          <a:xfrm>
+            <a:off x="4255312" y="5283200"/>
+            <a:ext cx="3300376" cy="406400"/>
+          </a:xfrm>
+          <a:prstGeom prst="rect">
+            <a:avLst/>
+          </a:prstGeom>
+        </p:spPr>
+      </p:pic>
+    </p:spTree>
+    <p:extLst>
+      <p:ext uri="{BB962C8B-B14F-4D97-AF65-F5344CB8AC3E}">
+        <p14:creationId xmlns:p14="http://schemas.microsoft.com/office/powerpoint/2010/main" val="3589399270"/>
+      </p:ext>
+    </p:extLst>
+  </p:cSld>
+  <p:clrMapOvr>
+    <a:masterClrMapping/>
+  </p:clrMapOvr>
+</p:sld>
+</file>
+
+<file path=ppt/slides/slide41.xml><?xml version="1.0" encoding="utf-8"?>
+<p:sld xmlns:a="http://schemas.openxmlformats.org/drawingml/2006/main" xmlns:r="http://schemas.openxmlformats.org/officeDocument/2006/relationships" xmlns:p="http://schemas.openxmlformats.org/presentationml/2006/main">
+  <p:cSld>
+    <p:spTree>
+      <p:nvGrpSpPr>
+        <p:cNvPr id="1" name=""/>
+        <p:cNvGrpSpPr/>
+        <p:nvPr/>
+      </p:nvGrpSpPr>
+      <p:grpSpPr>
+        <a:xfrm>
+          <a:off x="0" y="0"/>
+          <a:ext cx="0" cy="0"/>
+          <a:chOff x="0" y="0"/>
+          <a:chExt cx="0" cy="0"/>
+        </a:xfrm>
+      </p:grpSpPr>
+      <p:pic>
+        <p:nvPicPr>
+          <p:cNvPr id="2" name="Picture 1"/>
+          <p:cNvPicPr>
+            <a:picLocks noChangeAspect="1"/>
+          </p:cNvPicPr>
+          <p:nvPr/>
+        </p:nvPicPr>
+        <p:blipFill>
+          <a:blip r:embed="rId2"/>
+          <a:stretch>
+            <a:fillRect/>
+          </a:stretch>
+        </p:blipFill>
+        <p:spPr>
+          <a:xfrm>
+            <a:off x="343799" y="1298575"/>
+            <a:ext cx="3655801" cy="1993900"/>
+          </a:xfrm>
+          <a:prstGeom prst="rect">
+            <a:avLst/>
+          </a:prstGeom>
+        </p:spPr>
+      </p:pic>
+      <p:pic>
+        <p:nvPicPr>
+          <p:cNvPr id="3" name="Picture 2"/>
+          <p:cNvPicPr>
+            <a:picLocks noChangeAspect="1"/>
+          </p:cNvPicPr>
+          <p:nvPr/>
+        </p:nvPicPr>
+        <p:blipFill>
+          <a:blip r:embed="rId3"/>
+          <a:stretch>
+            <a:fillRect/>
+          </a:stretch>
+        </p:blipFill>
+        <p:spPr>
+          <a:xfrm>
+            <a:off x="572287" y="276225"/>
+            <a:ext cx="3198826" cy="647700"/>
+          </a:xfrm>
+          <a:prstGeom prst="rect">
+            <a:avLst/>
+          </a:prstGeom>
+        </p:spPr>
+      </p:pic>
+      <p:pic>
+        <p:nvPicPr>
+          <p:cNvPr id="4" name="Picture 3"/>
+          <p:cNvPicPr>
+            <a:picLocks noChangeAspect="1"/>
+          </p:cNvPicPr>
+          <p:nvPr/>
+        </p:nvPicPr>
+        <p:blipFill>
+          <a:blip r:embed="rId4"/>
+          <a:stretch>
+            <a:fillRect/>
+          </a:stretch>
+        </p:blipFill>
+        <p:spPr>
+          <a:xfrm>
+            <a:off x="572287" y="3457575"/>
+            <a:ext cx="1167825" cy="419100"/>
+          </a:xfrm>
+          <a:prstGeom prst="rect">
+            <a:avLst/>
+          </a:prstGeom>
+        </p:spPr>
+      </p:pic>
+      <p:pic>
+        <p:nvPicPr>
+          <p:cNvPr id="5" name="Picture 4"/>
+          <p:cNvPicPr>
+            <a:picLocks noChangeAspect="1"/>
+          </p:cNvPicPr>
+          <p:nvPr/>
+        </p:nvPicPr>
+        <p:blipFill>
+          <a:blip r:embed="rId5"/>
+          <a:stretch>
+            <a:fillRect/>
+          </a:stretch>
+        </p:blipFill>
+        <p:spPr>
+          <a:xfrm>
+            <a:off x="519544" y="3876675"/>
+            <a:ext cx="6600751" cy="2527300"/>
+          </a:xfrm>
+          <a:prstGeom prst="rect">
+            <a:avLst/>
+          </a:prstGeom>
+        </p:spPr>
+      </p:pic>
+      <p:pic>
+        <p:nvPicPr>
+          <p:cNvPr id="6" name="Picture 5"/>
+          <p:cNvPicPr>
+            <a:picLocks noChangeAspect="1"/>
+          </p:cNvPicPr>
+          <p:nvPr/>
+        </p:nvPicPr>
+        <p:blipFill>
+          <a:blip r:embed="rId6"/>
+          <a:stretch>
+            <a:fillRect/>
+          </a:stretch>
+        </p:blipFill>
+        <p:spPr>
+          <a:xfrm>
+            <a:off x="673856" y="6403975"/>
+            <a:ext cx="4011226" cy="317500"/>
+          </a:xfrm>
+          <a:prstGeom prst="rect">
+            <a:avLst/>
+          </a:prstGeom>
+        </p:spPr>
+      </p:pic>
+    </p:spTree>
+    <p:extLst>
+      <p:ext uri="{BB962C8B-B14F-4D97-AF65-F5344CB8AC3E}">
+        <p14:creationId xmlns:p14="http://schemas.microsoft.com/office/powerpoint/2010/main" val="3202051501"/>
+      </p:ext>
+    </p:extLst>
+  </p:cSld>
+  <p:clrMapOvr>
+    <a:masterClrMapping/>
+  </p:clrMapOvr>
+</p:sld>
+</file>
+
+<file path=ppt/slides/slide42.xml><?xml version="1.0" encoding="utf-8"?>
+<p:sld xmlns:a="http://schemas.openxmlformats.org/drawingml/2006/main" xmlns:r="http://schemas.openxmlformats.org/officeDocument/2006/relationships" xmlns:p="http://schemas.openxmlformats.org/presentationml/2006/main">
+  <p:cSld>
+    <p:spTree>
+      <p:nvGrpSpPr>
+        <p:cNvPr id="1" name=""/>
+        <p:cNvGrpSpPr/>
+        <p:nvPr/>
+      </p:nvGrpSpPr>
+      <p:grpSpPr>
+        <a:xfrm>
+          <a:off x="0" y="0"/>
+          <a:ext cx="0" cy="0"/>
+          <a:chOff x="0" y="0"/>
+          <a:chExt cx="0" cy="0"/>
+        </a:xfrm>
+      </p:grpSpPr>
+      <p:pic>
+        <p:nvPicPr>
+          <p:cNvPr id="2" name="Picture 1"/>
+          <p:cNvPicPr>
+            <a:picLocks noChangeAspect="1"/>
+          </p:cNvPicPr>
+          <p:nvPr/>
+        </p:nvPicPr>
+        <p:blipFill>
+          <a:blip r:embed="rId2"/>
+          <a:stretch>
+            <a:fillRect/>
+          </a:stretch>
+        </p:blipFill>
+        <p:spPr>
+          <a:xfrm>
+            <a:off x="196211" y="0"/>
+            <a:ext cx="1624800" cy="469900"/>
+          </a:xfrm>
+          <a:prstGeom prst="rect">
+            <a:avLst/>
+          </a:prstGeom>
+        </p:spPr>
+      </p:pic>
+      <p:pic>
+        <p:nvPicPr>
+          <p:cNvPr id="3" name="Picture 2"/>
+          <p:cNvPicPr>
+            <a:picLocks noChangeAspect="1"/>
+          </p:cNvPicPr>
+          <p:nvPr/>
+        </p:nvPicPr>
+        <p:blipFill>
+          <a:blip r:embed="rId3"/>
+          <a:stretch>
+            <a:fillRect/>
+          </a:stretch>
+        </p:blipFill>
+        <p:spPr>
+          <a:xfrm>
+            <a:off x="196211" y="469900"/>
+            <a:ext cx="1320150" cy="419100"/>
+          </a:xfrm>
+          <a:prstGeom prst="rect">
+            <a:avLst/>
+          </a:prstGeom>
+        </p:spPr>
+      </p:pic>
+      <p:pic>
+        <p:nvPicPr>
+          <p:cNvPr id="4" name="Picture 3"/>
+          <p:cNvPicPr>
+            <a:picLocks noChangeAspect="1"/>
+          </p:cNvPicPr>
+          <p:nvPr/>
+        </p:nvPicPr>
+        <p:blipFill>
+          <a:blip r:embed="rId4"/>
+          <a:stretch>
+            <a:fillRect/>
+          </a:stretch>
+        </p:blipFill>
+        <p:spPr>
+          <a:xfrm>
+            <a:off x="196211" y="939800"/>
+            <a:ext cx="3960451" cy="1879600"/>
+          </a:xfrm>
+          <a:prstGeom prst="rect">
+            <a:avLst/>
+          </a:prstGeom>
+        </p:spPr>
+      </p:pic>
+      <p:pic>
+        <p:nvPicPr>
+          <p:cNvPr id="5" name="Picture 4"/>
+          <p:cNvPicPr>
+            <a:picLocks noChangeAspect="1"/>
+          </p:cNvPicPr>
+          <p:nvPr/>
+        </p:nvPicPr>
+        <p:blipFill>
+          <a:blip r:embed="rId5"/>
+          <a:stretch>
+            <a:fillRect/>
+          </a:stretch>
+        </p:blipFill>
+        <p:spPr>
+          <a:xfrm>
+            <a:off x="297761" y="2395336"/>
+            <a:ext cx="7717801" cy="2832100"/>
+          </a:xfrm>
+          <a:prstGeom prst="rect">
+            <a:avLst/>
+          </a:prstGeom>
+        </p:spPr>
+      </p:pic>
+      <p:pic>
+        <p:nvPicPr>
+          <p:cNvPr id="6" name="Picture 5"/>
+          <p:cNvPicPr>
+            <a:picLocks noChangeAspect="1"/>
+          </p:cNvPicPr>
+          <p:nvPr/>
+        </p:nvPicPr>
+        <p:blipFill>
+          <a:blip r:embed="rId6"/>
+          <a:stretch>
+            <a:fillRect/>
+          </a:stretch>
+        </p:blipFill>
+        <p:spPr>
+          <a:xfrm>
+            <a:off x="729348" y="5471160"/>
+            <a:ext cx="2183325" cy="304800"/>
+          </a:xfrm>
+          <a:prstGeom prst="rect">
+            <a:avLst/>
+          </a:prstGeom>
+        </p:spPr>
+      </p:pic>
+    </p:spTree>
+    <p:extLst>
+      <p:ext uri="{BB962C8B-B14F-4D97-AF65-F5344CB8AC3E}">
+        <p14:creationId xmlns:p14="http://schemas.microsoft.com/office/powerpoint/2010/main" val="1498274958"/>
+      </p:ext>
+    </p:extLst>
+  </p:cSld>
+  <p:clrMapOvr>
+    <a:masterClrMapping/>
+  </p:clrMapOvr>
+</p:sld>
+</file>
+
+<file path=ppt/slides/slide43.xml><?xml version="1.0" encoding="utf-8"?>
+<p:sld xmlns:a="http://schemas.openxmlformats.org/drawingml/2006/main" xmlns:r="http://schemas.openxmlformats.org/officeDocument/2006/relationships" xmlns:p="http://schemas.openxmlformats.org/presentationml/2006/main">
+  <p:cSld>
+    <p:spTree>
+      <p:nvGrpSpPr>
+        <p:cNvPr id="1" name=""/>
+        <p:cNvGrpSpPr/>
+        <p:nvPr/>
+      </p:nvGrpSpPr>
+      <p:grpSpPr>
+        <a:xfrm>
+          <a:off x="0" y="0"/>
+          <a:ext cx="0" cy="0"/>
+          <a:chOff x="0" y="0"/>
+          <a:chExt cx="0" cy="0"/>
+        </a:xfrm>
+      </p:grpSpPr>
+      <p:pic>
+        <p:nvPicPr>
+          <p:cNvPr id="2" name="Picture 1"/>
+          <p:cNvPicPr>
+            <a:picLocks noChangeAspect="1"/>
+          </p:cNvPicPr>
+          <p:nvPr/>
+        </p:nvPicPr>
+        <p:blipFill>
+          <a:blip r:embed="rId2"/>
+          <a:stretch>
+            <a:fillRect/>
+          </a:stretch>
+        </p:blipFill>
+        <p:spPr>
+          <a:xfrm>
+            <a:off x="270352" y="636846"/>
+            <a:ext cx="8124001" cy="5384801"/>
+          </a:xfrm>
+          <a:prstGeom prst="rect">
+            <a:avLst/>
+          </a:prstGeom>
+        </p:spPr>
+      </p:pic>
+      <p:pic>
+        <p:nvPicPr>
+          <p:cNvPr id="3" name="Picture 2"/>
+          <p:cNvPicPr>
+            <a:picLocks noChangeAspect="1"/>
+          </p:cNvPicPr>
+          <p:nvPr/>
+        </p:nvPicPr>
+        <p:blipFill>
+          <a:blip r:embed="rId3"/>
+          <a:stretch>
+            <a:fillRect/>
+          </a:stretch>
+        </p:blipFill>
+        <p:spPr>
+          <a:xfrm>
+            <a:off x="270352" y="116378"/>
+            <a:ext cx="2640300" cy="355600"/>
+          </a:xfrm>
+          <a:prstGeom prst="rect">
+            <a:avLst/>
+          </a:prstGeom>
+        </p:spPr>
+      </p:pic>
+    </p:spTree>
+    <p:extLst>
+      <p:ext uri="{BB962C8B-B14F-4D97-AF65-F5344CB8AC3E}">
+        <p14:creationId xmlns:p14="http://schemas.microsoft.com/office/powerpoint/2010/main" val="3095779858"/>
+      </p:ext>
+    </p:extLst>
+  </p:cSld>
+  <p:clrMapOvr>
+    <a:masterClrMapping/>
+  </p:clrMapOvr>
+</p:sld>
+</file>
+
+<file path=ppt/slides/slide44.xml><?xml version="1.0" encoding="utf-8"?>
+<p:sld xmlns:a="http://schemas.openxmlformats.org/drawingml/2006/main" xmlns:r="http://schemas.openxmlformats.org/officeDocument/2006/relationships" xmlns:p="http://schemas.openxmlformats.org/presentationml/2006/main">
+  <p:cSld>
+    <p:spTree>
+      <p:nvGrpSpPr>
+        <p:cNvPr id="1" name=""/>
+        <p:cNvGrpSpPr/>
+        <p:nvPr/>
+      </p:nvGrpSpPr>
+      <p:grpSpPr>
+        <a:xfrm>
+          <a:off x="0" y="0"/>
+          <a:ext cx="0" cy="0"/>
+          <a:chOff x="0" y="0"/>
+          <a:chExt cx="0" cy="0"/>
+        </a:xfrm>
+      </p:grpSpPr>
+      <p:pic>
+        <p:nvPicPr>
+          <p:cNvPr id="2" name="Picture 1"/>
+          <p:cNvPicPr>
+            <a:picLocks noChangeAspect="1"/>
+          </p:cNvPicPr>
+          <p:nvPr/>
+        </p:nvPicPr>
+        <p:blipFill>
+          <a:blip r:embed="rId2"/>
+          <a:stretch>
+            <a:fillRect/>
+          </a:stretch>
+        </p:blipFill>
+        <p:spPr>
+          <a:xfrm>
+            <a:off x="327192" y="211167"/>
+            <a:ext cx="4671301" cy="317500"/>
+          </a:xfrm>
+          <a:prstGeom prst="rect">
+            <a:avLst/>
+          </a:prstGeom>
+        </p:spPr>
+      </p:pic>
+      <p:pic>
+        <p:nvPicPr>
+          <p:cNvPr id="3" name="Picture 2"/>
+          <p:cNvPicPr>
+            <a:picLocks noChangeAspect="1"/>
+          </p:cNvPicPr>
+          <p:nvPr/>
+        </p:nvPicPr>
+        <p:blipFill>
+          <a:blip r:embed="rId3"/>
+          <a:stretch>
+            <a:fillRect/>
+          </a:stretch>
+        </p:blipFill>
+        <p:spPr>
+          <a:xfrm>
+            <a:off x="206098" y="927447"/>
+            <a:ext cx="6143776" cy="1993900"/>
+          </a:xfrm>
+          <a:prstGeom prst="rect">
+            <a:avLst/>
+          </a:prstGeom>
+        </p:spPr>
+      </p:pic>
+      <p:pic>
+        <p:nvPicPr>
+          <p:cNvPr id="4" name="Picture 3"/>
+          <p:cNvPicPr>
+            <a:picLocks noChangeAspect="1"/>
+          </p:cNvPicPr>
+          <p:nvPr/>
+        </p:nvPicPr>
+        <p:blipFill>
+          <a:blip r:embed="rId4"/>
+          <a:stretch>
+            <a:fillRect/>
+          </a:stretch>
+        </p:blipFill>
+        <p:spPr>
+          <a:xfrm>
+            <a:off x="206098" y="2857038"/>
+            <a:ext cx="1980225" cy="279400"/>
+          </a:xfrm>
+          <a:prstGeom prst="rect">
+            <a:avLst/>
+          </a:prstGeom>
+        </p:spPr>
+      </p:pic>
+      <p:pic>
+        <p:nvPicPr>
+          <p:cNvPr id="5" name="Picture 4"/>
+          <p:cNvPicPr>
+            <a:picLocks noChangeAspect="1"/>
+          </p:cNvPicPr>
+          <p:nvPr/>
+        </p:nvPicPr>
+        <p:blipFill>
+          <a:blip r:embed="rId5"/>
+          <a:stretch>
+            <a:fillRect/>
+          </a:stretch>
+        </p:blipFill>
+        <p:spPr>
+          <a:xfrm>
+            <a:off x="206098" y="3208713"/>
+            <a:ext cx="7971676" cy="3482226"/>
+          </a:xfrm>
+          <a:prstGeom prst="rect">
+            <a:avLst/>
+          </a:prstGeom>
+        </p:spPr>
+      </p:pic>
+    </p:spTree>
+    <p:extLst>
+      <p:ext uri="{BB962C8B-B14F-4D97-AF65-F5344CB8AC3E}">
+        <p14:creationId xmlns:p14="http://schemas.microsoft.com/office/powerpoint/2010/main" val="833290166"/>
+      </p:ext>
+    </p:extLst>
+  </p:cSld>
+  <p:clrMapOvr>
+    <a:masterClrMapping/>
+  </p:clrMapOvr>
+</p:sld>
+</file>
+
+<file path=ppt/slides/slide45.xml><?xml version="1.0" encoding="utf-8"?>
+<p:sld xmlns:a="http://schemas.openxmlformats.org/drawingml/2006/main" xmlns:r="http://schemas.openxmlformats.org/officeDocument/2006/relationships" xmlns:p="http://schemas.openxmlformats.org/presentationml/2006/main">
+  <p:cSld>
+    <p:spTree>
+      <p:nvGrpSpPr>
+        <p:cNvPr id="1" name=""/>
+        <p:cNvGrpSpPr/>
+        <p:nvPr/>
+      </p:nvGrpSpPr>
+      <p:grpSpPr>
+        <a:xfrm>
+          <a:off x="0" y="0"/>
+          <a:ext cx="0" cy="0"/>
+          <a:chOff x="0" y="0"/>
+          <a:chExt cx="0" cy="0"/>
+        </a:xfrm>
+      </p:grpSpPr>
+      <p:pic>
+        <p:nvPicPr>
+          <p:cNvPr id="2" name="Picture 1"/>
+          <p:cNvPicPr>
+            <a:picLocks noChangeAspect="1"/>
+          </p:cNvPicPr>
+          <p:nvPr/>
+        </p:nvPicPr>
+        <p:blipFill>
+          <a:blip r:embed="rId2"/>
+          <a:stretch>
+            <a:fillRect/>
+          </a:stretch>
+        </p:blipFill>
+        <p:spPr>
+          <a:xfrm>
+            <a:off x="195087" y="281132"/>
+            <a:ext cx="2691075" cy="393700"/>
+          </a:xfrm>
+          <a:prstGeom prst="rect">
+            <a:avLst/>
+          </a:prstGeom>
+        </p:spPr>
+      </p:pic>
+      <p:pic>
+        <p:nvPicPr>
+          <p:cNvPr id="3" name="Picture 2"/>
+          <p:cNvPicPr>
+            <a:picLocks noChangeAspect="1"/>
+          </p:cNvPicPr>
+          <p:nvPr/>
+        </p:nvPicPr>
+        <p:blipFill>
+          <a:blip r:embed="rId3"/>
+          <a:stretch>
+            <a:fillRect/>
+          </a:stretch>
+        </p:blipFill>
+        <p:spPr>
+          <a:xfrm>
+            <a:off x="195087" y="875953"/>
+            <a:ext cx="7616251" cy="2628900"/>
+          </a:xfrm>
+          <a:prstGeom prst="rect">
+            <a:avLst/>
+          </a:prstGeom>
+        </p:spPr>
+      </p:pic>
+      <p:pic>
+        <p:nvPicPr>
+          <p:cNvPr id="4" name="Picture 3"/>
+          <p:cNvPicPr>
+            <a:picLocks noChangeAspect="1"/>
+          </p:cNvPicPr>
+          <p:nvPr/>
+        </p:nvPicPr>
+        <p:blipFill>
+          <a:blip r:embed="rId4"/>
+          <a:stretch>
+            <a:fillRect/>
+          </a:stretch>
+        </p:blipFill>
+        <p:spPr>
+          <a:xfrm>
+            <a:off x="451433" y="3511375"/>
+            <a:ext cx="2843400" cy="419100"/>
+          </a:xfrm>
+          <a:prstGeom prst="rect">
+            <a:avLst/>
+          </a:prstGeom>
+        </p:spPr>
+      </p:pic>
+      <p:pic>
+        <p:nvPicPr>
+          <p:cNvPr id="5" name="Picture 4"/>
+          <p:cNvPicPr>
+            <a:picLocks noChangeAspect="1"/>
+          </p:cNvPicPr>
+          <p:nvPr/>
+        </p:nvPicPr>
+        <p:blipFill>
+          <a:blip r:embed="rId5"/>
+          <a:stretch>
+            <a:fillRect/>
+          </a:stretch>
+        </p:blipFill>
+        <p:spPr>
+          <a:xfrm>
+            <a:off x="195087" y="3936997"/>
+            <a:ext cx="7920901" cy="2089730"/>
+          </a:xfrm>
+          <a:prstGeom prst="rect">
+            <a:avLst/>
+          </a:prstGeom>
+        </p:spPr>
+      </p:pic>
+      <p:pic>
+        <p:nvPicPr>
+          <p:cNvPr id="6" name="Picture 5"/>
+          <p:cNvPicPr>
+            <a:picLocks noChangeAspect="1"/>
+          </p:cNvPicPr>
+          <p:nvPr/>
+        </p:nvPicPr>
+        <p:blipFill>
+          <a:blip r:embed="rId6"/>
+          <a:stretch>
+            <a:fillRect/>
+          </a:stretch>
+        </p:blipFill>
+        <p:spPr>
+          <a:xfrm>
+            <a:off x="550512" y="6204180"/>
+            <a:ext cx="2335650" cy="368300"/>
+          </a:xfrm>
+          <a:prstGeom prst="rect">
+            <a:avLst/>
+          </a:prstGeom>
+        </p:spPr>
+      </p:pic>
+    </p:spTree>
+    <p:extLst>
+      <p:ext uri="{BB962C8B-B14F-4D97-AF65-F5344CB8AC3E}">
+        <p14:creationId xmlns:p14="http://schemas.microsoft.com/office/powerpoint/2010/main" val="3854746317"/>
+      </p:ext>
+    </p:extLst>
+  </p:cSld>
+  <p:clrMapOvr>
+    <a:masterClrMapping/>
+  </p:clrMapOvr>
+</p:sld>
+</file>
+
+<file path=ppt/slides/slide46.xml><?xml version="1.0" encoding="utf-8"?>
+<p:sld xmlns:a="http://schemas.openxmlformats.org/drawingml/2006/main" xmlns:r="http://schemas.openxmlformats.org/officeDocument/2006/relationships" xmlns:p="http://schemas.openxmlformats.org/presentationml/2006/main">
+  <p:cSld>
+    <p:spTree>
+      <p:nvGrpSpPr>
+        <p:cNvPr id="1" name=""/>
+        <p:cNvGrpSpPr/>
+        <p:nvPr/>
+      </p:nvGrpSpPr>
+      <p:grpSpPr>
+        <a:xfrm>
+          <a:off x="0" y="0"/>
+          <a:ext cx="0" cy="0"/>
+          <a:chOff x="0" y="0"/>
+          <a:chExt cx="0" cy="0"/>
+        </a:xfrm>
+      </p:grpSpPr>
+      <p:pic>
+        <p:nvPicPr>
+          <p:cNvPr id="2" name="Picture 1"/>
+          <p:cNvPicPr>
+            <a:picLocks noChangeAspect="1"/>
+          </p:cNvPicPr>
+          <p:nvPr/>
+        </p:nvPicPr>
+        <p:blipFill>
+          <a:blip r:embed="rId2"/>
+          <a:stretch>
+            <a:fillRect/>
+          </a:stretch>
+        </p:blipFill>
+        <p:spPr>
+          <a:xfrm>
+            <a:off x="2146558" y="315884"/>
+            <a:ext cx="7616251" cy="5809327"/>
+          </a:xfrm>
+          <a:prstGeom prst="rect">
+            <a:avLst/>
+          </a:prstGeom>
+        </p:spPr>
+      </p:pic>
+    </p:spTree>
+    <p:extLst>
+      <p:ext uri="{BB962C8B-B14F-4D97-AF65-F5344CB8AC3E}">
+        <p14:creationId xmlns:p14="http://schemas.microsoft.com/office/powerpoint/2010/main" val="2643473213"/>
+      </p:ext>
+    </p:extLst>
+  </p:cSld>
+  <p:clrMapOvr>
+    <a:masterClrMapping/>
+  </p:clrMapOvr>
+</p:sld>
+</file>
+
 <file path=ppt/slides/slide5.xml><?xml version="1.0" encoding="utf-8"?>
 <p:sld xmlns:a="http://schemas.openxmlformats.org/drawingml/2006/main" xmlns:r="http://schemas.openxmlformats.org/officeDocument/2006/relationships" xmlns:p="http://schemas.openxmlformats.org/presentationml/2006/main">
   <p:cSld>

</xml_diff>